<commit_message>
cambiata slide intro pres
</commit_message>
<xml_diff>
--- a/Presentazione/Presentazione_completa - Copy.pptx
+++ b/Presentazione/Presentazione_completa - Copy.pptx
@@ -5,17 +5,18 @@
     <p:sldMasterId id="2147483648" r:id="rId1"/>
   </p:sldMasterIdLst>
   <p:notesMasterIdLst>
-    <p:notesMasterId r:id="rId10"/>
+    <p:notesMasterId r:id="rId11"/>
   </p:notesMasterIdLst>
   <p:sldIdLst>
     <p:sldId id="292" r:id="rId2"/>
     <p:sldId id="295" r:id="rId3"/>
-    <p:sldId id="266" r:id="rId4"/>
-    <p:sldId id="299" r:id="rId5"/>
-    <p:sldId id="293" r:id="rId6"/>
-    <p:sldId id="297" r:id="rId7"/>
-    <p:sldId id="294" r:id="rId8"/>
-    <p:sldId id="296" r:id="rId9"/>
+    <p:sldId id="300" r:id="rId4"/>
+    <p:sldId id="266" r:id="rId5"/>
+    <p:sldId id="299" r:id="rId6"/>
+    <p:sldId id="293" r:id="rId7"/>
+    <p:sldId id="297" r:id="rId8"/>
+    <p:sldId id="294" r:id="rId9"/>
+    <p:sldId id="296" r:id="rId10"/>
   </p:sldIdLst>
   <p:sldSz cx="12192000" cy="6858000"/>
   <p:notesSz cx="6858000" cy="9144000"/>
@@ -194,8 +195,7 @@
 <file path=ppt/revisionInfo.xml><?xml version="1.0" encoding="utf-8"?>
 <p1510:revInfo xmlns:a="http://schemas.openxmlformats.org/drawingml/2006/main" xmlns:r="http://schemas.openxmlformats.org/officeDocument/2006/relationships" xmlns:p1510="http://schemas.microsoft.com/office/powerpoint/2015/10/main">
   <p1510:revLst>
-    <p1510:client id="{663EDA11-63A3-4725-9154-08D0D2B3E39E}" v="299" dt="2021-12-27T14:33:08.233"/>
-    <p1510:client id="{FD69EEA7-B36B-41F4-8A08-D3422F14508E}" v="9" dt="2021-12-27T00:54:05.499"/>
+    <p1510:client id="{663EDA11-63A3-4725-9154-08D0D2B3E39E}" v="302" dt="2021-12-28T14:38:24.446"/>
   </p1510:revLst>
 </p1510:revInfo>
 </file>
@@ -205,18 +205,49 @@
   <pc:docChgLst>
     <pc:chgData name="Silvia Grosso" userId="ae07bb24dcdc86e9" providerId="LiveId" clId="{663EDA11-63A3-4725-9154-08D0D2B3E39E}"/>
     <pc:docChg chg="undo custSel addSld delSld modSld">
-      <pc:chgData name="Silvia Grosso" userId="ae07bb24dcdc86e9" providerId="LiveId" clId="{663EDA11-63A3-4725-9154-08D0D2B3E39E}" dt="2021-12-27T14:33:08.233" v="1972" actId="1076"/>
+      <pc:chgData name="Silvia Grosso" userId="ae07bb24dcdc86e9" providerId="LiveId" clId="{663EDA11-63A3-4725-9154-08D0D2B3E39E}" dt="2021-12-28T14:53:21.740" v="2589" actId="5793"/>
       <pc:docMkLst>
         <pc:docMk/>
       </pc:docMkLst>
+      <pc:sldChg chg="modSp mod">
+        <pc:chgData name="Silvia Grosso" userId="ae07bb24dcdc86e9" providerId="LiveId" clId="{663EDA11-63A3-4725-9154-08D0D2B3E39E}" dt="2021-12-28T14:27:25.899" v="2346" actId="20577"/>
+        <pc:sldMkLst>
+          <pc:docMk/>
+          <pc:sldMk cId="1413317281" sldId="266"/>
+        </pc:sldMkLst>
+        <pc:spChg chg="mod">
+          <ac:chgData name="Silvia Grosso" userId="ae07bb24dcdc86e9" providerId="LiveId" clId="{663EDA11-63A3-4725-9154-08D0D2B3E39E}" dt="2021-12-28T14:27:25.899" v="2346" actId="20577"/>
+          <ac:spMkLst>
+            <pc:docMk/>
+            <pc:sldMk cId="1413317281" sldId="266"/>
+            <ac:spMk id="5" creationId="{89B91983-B758-4281-AC68-D9F7AB480AD9}"/>
+          </ac:spMkLst>
+        </pc:spChg>
+        <pc:picChg chg="mod">
+          <ac:chgData name="Silvia Grosso" userId="ae07bb24dcdc86e9" providerId="LiveId" clId="{663EDA11-63A3-4725-9154-08D0D2B3E39E}" dt="2021-12-28T14:23:29.971" v="2330" actId="1076"/>
+          <ac:picMkLst>
+            <pc:docMk/>
+            <pc:sldMk cId="1413317281" sldId="266"/>
+            <ac:picMk id="7" creationId="{16516D1F-51E0-104C-98E9-4FD4B30C3E7E}"/>
+          </ac:picMkLst>
+        </pc:picChg>
+        <pc:picChg chg="mod">
+          <ac:chgData name="Silvia Grosso" userId="ae07bb24dcdc86e9" providerId="LiveId" clId="{663EDA11-63A3-4725-9154-08D0D2B3E39E}" dt="2021-12-28T14:19:22.841" v="2329" actId="1076"/>
+          <ac:picMkLst>
+            <pc:docMk/>
+            <pc:sldMk cId="1413317281" sldId="266"/>
+            <ac:picMk id="10" creationId="{0AE553D6-63B8-A047-B67E-02D710030517}"/>
+          </ac:picMkLst>
+        </pc:picChg>
+      </pc:sldChg>
       <pc:sldChg chg="addSp delSp modSp mod">
-        <pc:chgData name="Silvia Grosso" userId="ae07bb24dcdc86e9" providerId="LiveId" clId="{663EDA11-63A3-4725-9154-08D0D2B3E39E}" dt="2021-12-27T14:06:33.152" v="1869" actId="14100"/>
+        <pc:chgData name="Silvia Grosso" userId="ae07bb24dcdc86e9" providerId="LiveId" clId="{663EDA11-63A3-4725-9154-08D0D2B3E39E}" dt="2021-12-28T14:25:56.764" v="2338" actId="20577"/>
         <pc:sldMkLst>
           <pc:docMk/>
           <pc:sldMk cId="455169881" sldId="293"/>
         </pc:sldMkLst>
         <pc:spChg chg="mod">
-          <ac:chgData name="Silvia Grosso" userId="ae07bb24dcdc86e9" providerId="LiveId" clId="{663EDA11-63A3-4725-9154-08D0D2B3E39E}" dt="2021-12-27T14:06:01.521" v="1865" actId="6549"/>
+          <ac:chgData name="Silvia Grosso" userId="ae07bb24dcdc86e9" providerId="LiveId" clId="{663EDA11-63A3-4725-9154-08D0D2B3E39E}" dt="2021-12-28T14:25:56.764" v="2338" actId="20577"/>
           <ac:spMkLst>
             <pc:docMk/>
             <pc:sldMk cId="455169881" sldId="293"/>
@@ -294,6 +325,21 @@
             <ac:picMk id="3" creationId="{BE7FA914-BE0F-40DA-ABDA-4F220218BD0D}"/>
           </ac:picMkLst>
         </pc:picChg>
+      </pc:sldChg>
+      <pc:sldChg chg="modSp mod">
+        <pc:chgData name="Silvia Grosso" userId="ae07bb24dcdc86e9" providerId="LiveId" clId="{663EDA11-63A3-4725-9154-08D0D2B3E39E}" dt="2021-12-28T14:40:32.418" v="2488" actId="20577"/>
+        <pc:sldMkLst>
+          <pc:docMk/>
+          <pc:sldMk cId="462686018" sldId="295"/>
+        </pc:sldMkLst>
+        <pc:spChg chg="mod">
+          <ac:chgData name="Silvia Grosso" userId="ae07bb24dcdc86e9" providerId="LiveId" clId="{663EDA11-63A3-4725-9154-08D0D2B3E39E}" dt="2021-12-28T14:40:32.418" v="2488" actId="20577"/>
+          <ac:spMkLst>
+            <pc:docMk/>
+            <pc:sldMk cId="462686018" sldId="295"/>
+            <ac:spMk id="6" creationId="{D13A722D-E148-4971-82F3-1C191AFD95ED}"/>
+          </ac:spMkLst>
+        </pc:spChg>
       </pc:sldChg>
       <pc:sldChg chg="modSp mod">
         <pc:chgData name="Silvia Grosso" userId="ae07bb24dcdc86e9" providerId="LiveId" clId="{663EDA11-63A3-4725-9154-08D0D2B3E39E}" dt="2021-12-27T11:20:33.455" v="297" actId="20577"/>
@@ -561,6 +607,51 @@
           <pc:sldMk cId="202300076" sldId="299"/>
         </pc:sldMkLst>
       </pc:sldChg>
+      <pc:sldChg chg="add del">
+        <pc:chgData name="Silvia Grosso" userId="ae07bb24dcdc86e9" providerId="LiveId" clId="{663EDA11-63A3-4725-9154-08D0D2B3E39E}" dt="2021-12-28T14:12:08.956" v="2138" actId="2890"/>
+        <pc:sldMkLst>
+          <pc:docMk/>
+          <pc:sldMk cId="281724162" sldId="300"/>
+        </pc:sldMkLst>
+      </pc:sldChg>
+      <pc:sldChg chg="modSp add mod">
+        <pc:chgData name="Silvia Grosso" userId="ae07bb24dcdc86e9" providerId="LiveId" clId="{663EDA11-63A3-4725-9154-08D0D2B3E39E}" dt="2021-12-28T14:53:21.740" v="2589" actId="5793"/>
+        <pc:sldMkLst>
+          <pc:docMk/>
+          <pc:sldMk cId="341538158" sldId="300"/>
+        </pc:sldMkLst>
+        <pc:spChg chg="mod">
+          <ac:chgData name="Silvia Grosso" userId="ae07bb24dcdc86e9" providerId="LiveId" clId="{663EDA11-63A3-4725-9154-08D0D2B3E39E}" dt="2021-12-28T14:27:28.068" v="2348" actId="20577"/>
+          <ac:spMkLst>
+            <pc:docMk/>
+            <pc:sldMk cId="341538158" sldId="300"/>
+            <ac:spMk id="5" creationId="{89B91983-B758-4281-AC68-D9F7AB480AD9}"/>
+          </ac:spMkLst>
+        </pc:spChg>
+        <pc:spChg chg="mod">
+          <ac:chgData name="Silvia Grosso" userId="ae07bb24dcdc86e9" providerId="LiveId" clId="{663EDA11-63A3-4725-9154-08D0D2B3E39E}" dt="2021-12-28T14:53:21.740" v="2589" actId="5793"/>
+          <ac:spMkLst>
+            <pc:docMk/>
+            <pc:sldMk cId="341538158" sldId="300"/>
+            <ac:spMk id="6" creationId="{D13A722D-E148-4971-82F3-1C191AFD95ED}"/>
+          </ac:spMkLst>
+        </pc:spChg>
+        <pc:cxnChg chg="mod">
+          <ac:chgData name="Silvia Grosso" userId="ae07bb24dcdc86e9" providerId="LiveId" clId="{663EDA11-63A3-4725-9154-08D0D2B3E39E}" dt="2021-12-28T14:26:18.654" v="2341" actId="14100"/>
+          <ac:cxnSpMkLst>
+            <pc:docMk/>
+            <pc:sldMk cId="341538158" sldId="300"/>
+            <ac:cxnSpMk id="4" creationId="{51FD34F7-E331-45F9-984B-6D3860116CA5}"/>
+          </ac:cxnSpMkLst>
+        </pc:cxnChg>
+      </pc:sldChg>
+      <pc:sldChg chg="add del">
+        <pc:chgData name="Silvia Grosso" userId="ae07bb24dcdc86e9" providerId="LiveId" clId="{663EDA11-63A3-4725-9154-08D0D2B3E39E}" dt="2021-12-28T14:12:18.496" v="2140" actId="2890"/>
+        <pc:sldMkLst>
+          <pc:docMk/>
+          <pc:sldMk cId="2479181778" sldId="300"/>
+        </pc:sldMkLst>
+      </pc:sldChg>
     </pc:docChg>
   </pc:docChgLst>
 </pc:chgInfo>
@@ -648,7 +739,7 @@
           <a:p>
             <a:fld id="{445FCF14-918E-4047-8BBB-15CFF9EA5E07}" type="datetimeFigureOut">
               <a:rPr lang="it-IT" smtClean="0"/>
-              <a:t>27/12/2021</a:t>
+              <a:t>28/12/2021</a:t>
             </a:fld>
             <a:endParaRPr lang="it-IT"/>
           </a:p>
@@ -1062,7 +1153,7 @@
           <a:p>
             <a:fld id="{AA3A6BE5-8C39-481F-A270-BEF917F1E5E1}" type="datetimeFigureOut">
               <a:rPr lang="it-IT" smtClean="0"/>
-              <a:t>27/12/2021</a:t>
+              <a:t>28/12/2021</a:t>
             </a:fld>
             <a:endParaRPr lang="it-IT"/>
           </a:p>
@@ -1260,7 +1351,7 @@
           <a:p>
             <a:fld id="{AA3A6BE5-8C39-481F-A270-BEF917F1E5E1}" type="datetimeFigureOut">
               <a:rPr lang="it-IT" smtClean="0"/>
-              <a:t>27/12/2021</a:t>
+              <a:t>28/12/2021</a:t>
             </a:fld>
             <a:endParaRPr lang="it-IT"/>
           </a:p>
@@ -1468,7 +1559,7 @@
           <a:p>
             <a:fld id="{AA3A6BE5-8C39-481F-A270-BEF917F1E5E1}" type="datetimeFigureOut">
               <a:rPr lang="it-IT" smtClean="0"/>
-              <a:t>27/12/2021</a:t>
+              <a:t>28/12/2021</a:t>
             </a:fld>
             <a:endParaRPr lang="it-IT"/>
           </a:p>
@@ -1666,7 +1757,7 @@
           <a:p>
             <a:fld id="{AA3A6BE5-8C39-481F-A270-BEF917F1E5E1}" type="datetimeFigureOut">
               <a:rPr lang="it-IT" smtClean="0"/>
-              <a:t>27/12/2021</a:t>
+              <a:t>28/12/2021</a:t>
             </a:fld>
             <a:endParaRPr lang="it-IT"/>
           </a:p>
@@ -1941,7 +2032,7 @@
           <a:p>
             <a:fld id="{AA3A6BE5-8C39-481F-A270-BEF917F1E5E1}" type="datetimeFigureOut">
               <a:rPr lang="it-IT" smtClean="0"/>
-              <a:t>27/12/2021</a:t>
+              <a:t>28/12/2021</a:t>
             </a:fld>
             <a:endParaRPr lang="it-IT"/>
           </a:p>
@@ -2206,7 +2297,7 @@
           <a:p>
             <a:fld id="{AA3A6BE5-8C39-481F-A270-BEF917F1E5E1}" type="datetimeFigureOut">
               <a:rPr lang="it-IT" smtClean="0"/>
-              <a:t>27/12/2021</a:t>
+              <a:t>28/12/2021</a:t>
             </a:fld>
             <a:endParaRPr lang="it-IT"/>
           </a:p>
@@ -2618,7 +2709,7 @@
           <a:p>
             <a:fld id="{AA3A6BE5-8C39-481F-A270-BEF917F1E5E1}" type="datetimeFigureOut">
               <a:rPr lang="it-IT" smtClean="0"/>
-              <a:t>27/12/2021</a:t>
+              <a:t>28/12/2021</a:t>
             </a:fld>
             <a:endParaRPr lang="it-IT"/>
           </a:p>
@@ -2759,7 +2850,7 @@
           <a:p>
             <a:fld id="{AA3A6BE5-8C39-481F-A270-BEF917F1E5E1}" type="datetimeFigureOut">
               <a:rPr lang="it-IT" smtClean="0"/>
-              <a:t>27/12/2021</a:t>
+              <a:t>28/12/2021</a:t>
             </a:fld>
             <a:endParaRPr lang="it-IT"/>
           </a:p>
@@ -2872,7 +2963,7 @@
           <a:p>
             <a:fld id="{AA3A6BE5-8C39-481F-A270-BEF917F1E5E1}" type="datetimeFigureOut">
               <a:rPr lang="it-IT" smtClean="0"/>
-              <a:t>27/12/2021</a:t>
+              <a:t>28/12/2021</a:t>
             </a:fld>
             <a:endParaRPr lang="it-IT"/>
           </a:p>
@@ -3183,7 +3274,7 @@
           <a:p>
             <a:fld id="{AA3A6BE5-8C39-481F-A270-BEF917F1E5E1}" type="datetimeFigureOut">
               <a:rPr lang="it-IT" smtClean="0"/>
-              <a:t>27/12/2021</a:t>
+              <a:t>28/12/2021</a:t>
             </a:fld>
             <a:endParaRPr lang="it-IT"/>
           </a:p>
@@ -3471,7 +3562,7 @@
           <a:p>
             <a:fld id="{AA3A6BE5-8C39-481F-A270-BEF917F1E5E1}" type="datetimeFigureOut">
               <a:rPr lang="it-IT" smtClean="0"/>
-              <a:t>27/12/2021</a:t>
+              <a:t>28/12/2021</a:t>
             </a:fld>
             <a:endParaRPr lang="it-IT"/>
           </a:p>
@@ -3712,7 +3803,7 @@
           <a:p>
             <a:fld id="{AA3A6BE5-8C39-481F-A270-BEF917F1E5E1}" type="datetimeFigureOut">
               <a:rPr lang="it-IT" smtClean="0"/>
-              <a:t>27/12/2021</a:t>
+              <a:t>28/12/2021</a:t>
             </a:fld>
             <a:endParaRPr lang="it-IT"/>
           </a:p>
@@ -4694,28 +4785,28 @@
                 <a:latin typeface="Poppins Light" panose="00000400000000000000" pitchFamily="2" charset="0"/>
                 <a:cs typeface="Poppins Light" panose="00000400000000000000" pitchFamily="2" charset="0"/>
               </a:rPr>
-              <a:t> le </a:t>
+              <a:t> le classi di </a:t>
             </a:r>
             <a:r>
               <a:rPr lang="en-US" sz="1400" dirty="0" err="1">
                 <a:latin typeface="Poppins Light" panose="00000400000000000000" pitchFamily="2" charset="0"/>
                 <a:cs typeface="Poppins Light" panose="00000400000000000000" pitchFamily="2" charset="0"/>
               </a:rPr>
-              <a:t>classi</a:t>
+              <a:t>utenti</a:t>
             </a:r>
             <a:r>
               <a:rPr lang="en-US" sz="1400" dirty="0">
                 <a:latin typeface="Poppins Light" panose="00000400000000000000" pitchFamily="2" charset="0"/>
                 <a:cs typeface="Poppins Light" panose="00000400000000000000" pitchFamily="2" charset="0"/>
               </a:rPr>
-              <a:t> di </a:t>
+              <a:t>  </a:t>
             </a:r>
             <a:r>
               <a:rPr lang="en-US" sz="1400" dirty="0" err="1">
                 <a:latin typeface="Poppins Light" panose="00000400000000000000" pitchFamily="2" charset="0"/>
                 <a:cs typeface="Poppins Light" panose="00000400000000000000" pitchFamily="2" charset="0"/>
               </a:rPr>
-              <a:t>utenti</a:t>
+              <a:t>che</a:t>
             </a:r>
             <a:r>
               <a:rPr lang="en-US" sz="1400" dirty="0">
@@ -4729,7 +4820,7 @@
                 <a:latin typeface="Poppins Light" panose="00000400000000000000" pitchFamily="2" charset="0"/>
                 <a:cs typeface="Poppins Light" panose="00000400000000000000" pitchFamily="2" charset="0"/>
               </a:rPr>
-              <a:t>che</a:t>
+              <a:t>si</a:t>
             </a:r>
             <a:r>
               <a:rPr lang="en-US" sz="1400" dirty="0">
@@ -4743,28 +4834,14 @@
                 <a:latin typeface="Poppins Light" panose="00000400000000000000" pitchFamily="2" charset="0"/>
                 <a:cs typeface="Poppins Light" panose="00000400000000000000" pitchFamily="2" charset="0"/>
               </a:rPr>
-              <a:t>si</a:t>
+              <a:t>interfacciano</a:t>
             </a:r>
             <a:r>
               <a:rPr lang="en-US" sz="1400" dirty="0">
                 <a:latin typeface="Poppins Light" panose="00000400000000000000" pitchFamily="2" charset="0"/>
                 <a:cs typeface="Poppins Light" panose="00000400000000000000" pitchFamily="2" charset="0"/>
               </a:rPr>
-              <a:t> </a:t>
-            </a:r>
-            <a:r>
-              <a:rPr lang="en-US" sz="1400" dirty="0" err="1">
-                <a:latin typeface="Poppins Light" panose="00000400000000000000" pitchFamily="2" charset="0"/>
-                <a:cs typeface="Poppins Light" panose="00000400000000000000" pitchFamily="2" charset="0"/>
-              </a:rPr>
-              <a:t>interfacciano</a:t>
-            </a:r>
-            <a:r>
-              <a:rPr lang="en-US" sz="1400" dirty="0">
-                <a:latin typeface="Poppins Light" panose="00000400000000000000" pitchFamily="2" charset="0"/>
-                <a:cs typeface="Poppins Light" panose="00000400000000000000" pitchFamily="2" charset="0"/>
-              </a:rPr>
-              <a:t> con le ICTs ?</a:t>
+              <a:t> con le ICTs  ?</a:t>
             </a:r>
           </a:p>
           <a:p>
@@ -5093,21 +5170,7 @@
                 <a:latin typeface="Poppins Light" panose="00000400000000000000" pitchFamily="2" charset="0"/>
                 <a:cs typeface="Poppins Light" panose="00000400000000000000" pitchFamily="2" charset="0"/>
               </a:rPr>
-              <a:t> </a:t>
-            </a:r>
-            <a:r>
-              <a:rPr lang="en-US" sz="1400" dirty="0" err="1">
-                <a:latin typeface="Poppins Light" panose="00000400000000000000" pitchFamily="2" charset="0"/>
-                <a:cs typeface="Poppins Light" panose="00000400000000000000" pitchFamily="2" charset="0"/>
-              </a:rPr>
-              <a:t>digitali</a:t>
-            </a:r>
-            <a:r>
-              <a:rPr lang="en-US" sz="1400" dirty="0">
-                <a:latin typeface="Poppins Light" panose="00000400000000000000" pitchFamily="2" charset="0"/>
-                <a:cs typeface="Poppins Light" panose="00000400000000000000" pitchFamily="2" charset="0"/>
-              </a:rPr>
-              <a:t> ?</a:t>
+              <a:t> digitali ?</a:t>
             </a:r>
           </a:p>
           <a:p>
@@ -5301,6 +5364,594 @@
           <a:lstStyle/>
           <a:p>
             <a:r>
+              <a:rPr lang="it-IT" sz="3200" dirty="0">
+                <a:latin typeface="Lato Black" panose="020F0502020204030203" pitchFamily="34" charset="0"/>
+                <a:ea typeface="Lato Black" panose="020F0502020204030203" pitchFamily="34" charset="0"/>
+                <a:cs typeface="Lato Black" panose="020F0502020204030203" pitchFamily="34" charset="0"/>
+              </a:rPr>
+              <a:t>La ricerca</a:t>
+            </a:r>
+          </a:p>
+        </p:txBody>
+      </p:sp>
+      <p:sp>
+        <p:nvSpPr>
+          <p:cNvPr id="6" name="CasellaDiTesto 5">
+            <a:extLst>
+              <a:ext uri="{FF2B5EF4-FFF2-40B4-BE49-F238E27FC236}">
+                <a16:creationId xmlns:a16="http://schemas.microsoft.com/office/drawing/2014/main" id="{D13A722D-E148-4971-82F3-1C191AFD95ED}"/>
+              </a:ext>
+            </a:extLst>
+          </p:cNvPr>
+          <p:cNvSpPr txBox="1"/>
+          <p:nvPr/>
+        </p:nvSpPr>
+        <p:spPr>
+          <a:xfrm>
+            <a:off x="704848" y="2024062"/>
+            <a:ext cx="4839918" cy="4278094"/>
+          </a:xfrm>
+          <a:prstGeom prst="rect">
+            <a:avLst/>
+          </a:prstGeom>
+          <a:noFill/>
+        </p:spPr>
+        <p:txBody>
+          <a:bodyPr wrap="square" rtlCol="0">
+            <a:spAutoFit/>
+          </a:bodyPr>
+          <a:lstStyle/>
+          <a:p>
+            <a:pPr marL="285750" indent="-285750">
+              <a:spcAft>
+                <a:spcPts val="1200"/>
+              </a:spcAft>
+              <a:buFont typeface="Wingdings" panose="05000000000000000000" pitchFamily="2" charset="2"/>
+              <a:buChar char="q"/>
+            </a:pPr>
+            <a:r>
+              <a:rPr lang="en-US" sz="1400" dirty="0" err="1">
+                <a:latin typeface="Poppins Light" panose="00000400000000000000" pitchFamily="2" charset="0"/>
+                <a:cs typeface="Poppins Light" panose="00000400000000000000" pitchFamily="2" charset="0"/>
+              </a:rPr>
+              <a:t>Quali</a:t>
+            </a:r>
+            <a:r>
+              <a:rPr lang="en-US" sz="1400" dirty="0">
+                <a:latin typeface="Poppins Light" panose="00000400000000000000" pitchFamily="2" charset="0"/>
+                <a:cs typeface="Poppins Light" panose="00000400000000000000" pitchFamily="2" charset="0"/>
+              </a:rPr>
+              <a:t> </a:t>
+            </a:r>
+            <a:r>
+              <a:rPr lang="en-US" sz="1400" dirty="0" err="1">
+                <a:latin typeface="Poppins Light" panose="00000400000000000000" pitchFamily="2" charset="0"/>
+                <a:cs typeface="Poppins Light" panose="00000400000000000000" pitchFamily="2" charset="0"/>
+              </a:rPr>
+              <a:t>sono</a:t>
+            </a:r>
+            <a:r>
+              <a:rPr lang="en-US" sz="1400" dirty="0">
+                <a:latin typeface="Poppins Light" panose="00000400000000000000" pitchFamily="2" charset="0"/>
+                <a:cs typeface="Poppins Light" panose="00000400000000000000" pitchFamily="2" charset="0"/>
+              </a:rPr>
+              <a:t> le classi di </a:t>
+            </a:r>
+            <a:r>
+              <a:rPr lang="en-US" sz="1400" dirty="0" err="1">
+                <a:latin typeface="Poppins Light" panose="00000400000000000000" pitchFamily="2" charset="0"/>
+                <a:cs typeface="Poppins Light" panose="00000400000000000000" pitchFamily="2" charset="0"/>
+              </a:rPr>
+              <a:t>utenti</a:t>
+            </a:r>
+            <a:r>
+              <a:rPr lang="en-US" sz="1400" dirty="0">
+                <a:latin typeface="Poppins Light" panose="00000400000000000000" pitchFamily="2" charset="0"/>
+                <a:cs typeface="Poppins Light" panose="00000400000000000000" pitchFamily="2" charset="0"/>
+              </a:rPr>
+              <a:t>  digitali e come </a:t>
+            </a:r>
+            <a:r>
+              <a:rPr lang="en-US" sz="1400" dirty="0" err="1">
+                <a:latin typeface="Poppins Light" panose="00000400000000000000" pitchFamily="2" charset="0"/>
+                <a:cs typeface="Poppins Light" panose="00000400000000000000" pitchFamily="2" charset="0"/>
+              </a:rPr>
+              <a:t>si</a:t>
+            </a:r>
+            <a:r>
+              <a:rPr lang="en-US" sz="1400" dirty="0">
+                <a:latin typeface="Poppins Light" panose="00000400000000000000" pitchFamily="2" charset="0"/>
+                <a:cs typeface="Poppins Light" panose="00000400000000000000" pitchFamily="2" charset="0"/>
+              </a:rPr>
+              <a:t> </a:t>
+            </a:r>
+            <a:r>
+              <a:rPr lang="en-US" sz="1400" dirty="0" err="1">
+                <a:latin typeface="Poppins Light" panose="00000400000000000000" pitchFamily="2" charset="0"/>
+                <a:cs typeface="Poppins Light" panose="00000400000000000000" pitchFamily="2" charset="0"/>
+              </a:rPr>
+              <a:t>interfacciano</a:t>
+            </a:r>
+            <a:r>
+              <a:rPr lang="en-US" sz="1400" dirty="0">
+                <a:latin typeface="Poppins Light" panose="00000400000000000000" pitchFamily="2" charset="0"/>
+                <a:cs typeface="Poppins Light" panose="00000400000000000000" pitchFamily="2" charset="0"/>
+              </a:rPr>
+              <a:t> con le ICTs ?</a:t>
+            </a:r>
+          </a:p>
+          <a:p>
+            <a:pPr marL="285750" indent="-285750">
+              <a:spcAft>
+                <a:spcPts val="1200"/>
+              </a:spcAft>
+              <a:buFont typeface="Wingdings" panose="05000000000000000000" pitchFamily="2" charset="2"/>
+              <a:buChar char="q"/>
+            </a:pPr>
+            <a:endParaRPr lang="en-US" sz="1400" dirty="0">
+              <a:latin typeface="Poppins Light" panose="00000400000000000000" pitchFamily="2" charset="0"/>
+              <a:cs typeface="Poppins Light" panose="00000400000000000000" pitchFamily="2" charset="0"/>
+            </a:endParaRPr>
+          </a:p>
+          <a:p>
+            <a:pPr>
+              <a:spcAft>
+                <a:spcPts val="1200"/>
+              </a:spcAft>
+            </a:pPr>
+            <a:endParaRPr lang="en-US" sz="1400" dirty="0">
+              <a:latin typeface="Poppins Light" panose="00000400000000000000" pitchFamily="2" charset="0"/>
+              <a:cs typeface="Poppins Light" panose="00000400000000000000" pitchFamily="2" charset="0"/>
+            </a:endParaRPr>
+          </a:p>
+          <a:p>
+            <a:pPr marL="285750" indent="-285750">
+              <a:spcAft>
+                <a:spcPts val="1200"/>
+              </a:spcAft>
+              <a:buFont typeface="Wingdings" panose="05000000000000000000" pitchFamily="2" charset="2"/>
+              <a:buChar char="q"/>
+            </a:pPr>
+            <a:r>
+              <a:rPr lang="en-US" sz="1400" dirty="0" err="1">
+                <a:latin typeface="Poppins Light" panose="00000400000000000000" pitchFamily="2" charset="0"/>
+                <a:cs typeface="Poppins Light" panose="00000400000000000000" pitchFamily="2" charset="0"/>
+              </a:rPr>
+              <a:t>Analisi</a:t>
+            </a:r>
+            <a:r>
+              <a:rPr lang="en-US" sz="1400" dirty="0">
+                <a:latin typeface="Poppins Light" panose="00000400000000000000" pitchFamily="2" charset="0"/>
+                <a:cs typeface="Poppins Light" panose="00000400000000000000" pitchFamily="2" charset="0"/>
+              </a:rPr>
+              <a:t> </a:t>
+            </a:r>
+            <a:r>
+              <a:rPr lang="en-US" sz="1400" dirty="0" err="1">
+                <a:latin typeface="Poppins Light" panose="00000400000000000000" pitchFamily="2" charset="0"/>
+                <a:cs typeface="Poppins Light" panose="00000400000000000000" pitchFamily="2" charset="0"/>
+              </a:rPr>
+              <a:t>storica</a:t>
+            </a:r>
+            <a:r>
+              <a:rPr lang="en-US" sz="1400" dirty="0">
+                <a:latin typeface="Poppins Light" panose="00000400000000000000" pitchFamily="2" charset="0"/>
+                <a:cs typeface="Poppins Light" panose="00000400000000000000" pitchFamily="2" charset="0"/>
+              </a:rPr>
+              <a:t> </a:t>
+            </a:r>
+            <a:r>
+              <a:rPr lang="en-US" sz="1400" dirty="0" err="1">
+                <a:latin typeface="Poppins Light" panose="00000400000000000000" pitchFamily="2" charset="0"/>
+                <a:cs typeface="Poppins Light" panose="00000400000000000000" pitchFamily="2" charset="0"/>
+              </a:rPr>
+              <a:t>della</a:t>
+            </a:r>
+            <a:r>
+              <a:rPr lang="en-US" sz="1400" dirty="0">
+                <a:latin typeface="Poppins Light" panose="00000400000000000000" pitchFamily="2" charset="0"/>
+                <a:cs typeface="Poppins Light" panose="00000400000000000000" pitchFamily="2" charset="0"/>
+              </a:rPr>
+              <a:t> </a:t>
+            </a:r>
+            <a:r>
+              <a:rPr lang="en-US" sz="1400" dirty="0" err="1">
+                <a:latin typeface="Poppins Light" panose="00000400000000000000" pitchFamily="2" charset="0"/>
+                <a:cs typeface="Poppins Light" panose="00000400000000000000" pitchFamily="2" charset="0"/>
+              </a:rPr>
+              <a:t>rivoluzione</a:t>
+            </a:r>
+            <a:r>
+              <a:rPr lang="en-US" sz="1400" dirty="0">
+                <a:latin typeface="Poppins Light" panose="00000400000000000000" pitchFamily="2" charset="0"/>
+                <a:cs typeface="Poppins Light" panose="00000400000000000000" pitchFamily="2" charset="0"/>
+              </a:rPr>
+              <a:t> </a:t>
+            </a:r>
+            <a:r>
+              <a:rPr lang="en-US" sz="1400" dirty="0" err="1">
+                <a:latin typeface="Poppins Light" panose="00000400000000000000" pitchFamily="2" charset="0"/>
+                <a:cs typeface="Poppins Light" panose="00000400000000000000" pitchFamily="2" charset="0"/>
+              </a:rPr>
+              <a:t>digitale</a:t>
+            </a:r>
+            <a:r>
+              <a:rPr lang="en-US" sz="1400" dirty="0">
+                <a:latin typeface="Poppins Light" panose="00000400000000000000" pitchFamily="2" charset="0"/>
+                <a:cs typeface="Poppins Light" panose="00000400000000000000" pitchFamily="2" charset="0"/>
+              </a:rPr>
+              <a:t>:</a:t>
+            </a:r>
+          </a:p>
+          <a:p>
+            <a:pPr lvl="1">
+              <a:spcAft>
+                <a:spcPts val="1200"/>
+              </a:spcAft>
+            </a:pPr>
+            <a:r>
+              <a:rPr lang="en-US" sz="1400" dirty="0" err="1">
+                <a:latin typeface="Poppins Light" panose="00000400000000000000" pitchFamily="2" charset="0"/>
+                <a:cs typeface="Poppins Light" panose="00000400000000000000" pitchFamily="2" charset="0"/>
+              </a:rPr>
+              <a:t>perchè</a:t>
+            </a:r>
+            <a:r>
+              <a:rPr lang="en-US" sz="1400" dirty="0">
+                <a:latin typeface="Poppins Light" panose="00000400000000000000" pitchFamily="2" charset="0"/>
+                <a:cs typeface="Poppins Light" panose="00000400000000000000" pitchFamily="2" charset="0"/>
+              </a:rPr>
+              <a:t> </a:t>
+            </a:r>
+            <a:r>
+              <a:rPr lang="en-US" sz="1400" dirty="0" err="1">
+                <a:latin typeface="Poppins Light" panose="00000400000000000000" pitchFamily="2" charset="0"/>
+                <a:cs typeface="Poppins Light" panose="00000400000000000000" pitchFamily="2" charset="0"/>
+              </a:rPr>
+              <a:t>manca</a:t>
+            </a:r>
+            <a:r>
+              <a:rPr lang="en-US" sz="1400" dirty="0">
+                <a:latin typeface="Poppins Light" panose="00000400000000000000" pitchFamily="2" charset="0"/>
+                <a:cs typeface="Poppins Light" panose="00000400000000000000" pitchFamily="2" charset="0"/>
+              </a:rPr>
+              <a:t> una </a:t>
+            </a:r>
+            <a:r>
+              <a:rPr lang="en-US" sz="1400" dirty="0" err="1">
+                <a:latin typeface="Poppins Light" panose="00000400000000000000" pitchFamily="2" charset="0"/>
+                <a:cs typeface="Poppins Light" panose="00000400000000000000" pitchFamily="2" charset="0"/>
+              </a:rPr>
+              <a:t>figura</a:t>
+            </a:r>
+            <a:r>
+              <a:rPr lang="en-US" sz="1400" dirty="0">
+                <a:latin typeface="Poppins Light" panose="00000400000000000000" pitchFamily="2" charset="0"/>
+                <a:cs typeface="Poppins Light" panose="00000400000000000000" pitchFamily="2" charset="0"/>
+              </a:rPr>
+              <a:t> </a:t>
+            </a:r>
+            <a:r>
+              <a:rPr lang="en-US" sz="1400" dirty="0" err="1">
+                <a:latin typeface="Poppins Light" panose="00000400000000000000" pitchFamily="2" charset="0"/>
+                <a:cs typeface="Poppins Light" panose="00000400000000000000" pitchFamily="2" charset="0"/>
+              </a:rPr>
+              <a:t>sociale</a:t>
+            </a:r>
+            <a:r>
+              <a:rPr lang="en-US" sz="1400" dirty="0">
+                <a:latin typeface="Poppins Light" panose="00000400000000000000" pitchFamily="2" charset="0"/>
+                <a:cs typeface="Poppins Light" panose="00000400000000000000" pitchFamily="2" charset="0"/>
+              </a:rPr>
+              <a:t> </a:t>
+            </a:r>
+            <a:r>
+              <a:rPr lang="en-US" sz="1400" dirty="0" err="1">
+                <a:latin typeface="Poppins Light" panose="00000400000000000000" pitchFamily="2" charset="0"/>
+                <a:cs typeface="Poppins Light" panose="00000400000000000000" pitchFamily="2" charset="0"/>
+              </a:rPr>
+              <a:t>che</a:t>
+            </a:r>
+            <a:r>
+              <a:rPr lang="en-US" sz="1400" dirty="0">
+                <a:latin typeface="Poppins Light" panose="00000400000000000000" pitchFamily="2" charset="0"/>
+                <a:cs typeface="Poppins Light" panose="00000400000000000000" pitchFamily="2" charset="0"/>
+              </a:rPr>
+              <a:t> </a:t>
+            </a:r>
+            <a:r>
+              <a:rPr lang="en-US" sz="1400" dirty="0" err="1">
+                <a:latin typeface="Poppins Light" panose="00000400000000000000" pitchFamily="2" charset="0"/>
+                <a:cs typeface="Poppins Light" panose="00000400000000000000" pitchFamily="2" charset="0"/>
+              </a:rPr>
+              <a:t>detenga</a:t>
+            </a:r>
+            <a:r>
+              <a:rPr lang="en-US" sz="1400" dirty="0">
+                <a:latin typeface="Poppins Light" panose="00000400000000000000" pitchFamily="2" charset="0"/>
+                <a:cs typeface="Poppins Light" panose="00000400000000000000" pitchFamily="2" charset="0"/>
+              </a:rPr>
+              <a:t> la “</a:t>
+            </a:r>
+            <a:r>
+              <a:rPr lang="en-US" sz="1400" dirty="0" err="1">
+                <a:latin typeface="Poppins Light" panose="00000400000000000000" pitchFamily="2" charset="0"/>
+                <a:cs typeface="Poppins Light" panose="00000400000000000000" pitchFamily="2" charset="0"/>
+              </a:rPr>
+              <a:t>saggezza</a:t>
+            </a:r>
+            <a:r>
+              <a:rPr lang="en-US" sz="1400" dirty="0">
+                <a:latin typeface="Poppins Light" panose="00000400000000000000" pitchFamily="2" charset="0"/>
+                <a:cs typeface="Poppins Light" panose="00000400000000000000" pitchFamily="2" charset="0"/>
+              </a:rPr>
+              <a:t> </a:t>
+            </a:r>
+            <a:r>
+              <a:rPr lang="en-US" sz="1400" dirty="0" err="1">
+                <a:latin typeface="Poppins Light" panose="00000400000000000000" pitchFamily="2" charset="0"/>
+                <a:cs typeface="Poppins Light" panose="00000400000000000000" pitchFamily="2" charset="0"/>
+              </a:rPr>
+              <a:t>digitale</a:t>
+            </a:r>
+            <a:r>
+              <a:rPr lang="en-US" sz="1400" dirty="0">
+                <a:latin typeface="Poppins Light" panose="00000400000000000000" pitchFamily="2" charset="0"/>
+                <a:cs typeface="Poppins Light" panose="00000400000000000000" pitchFamily="2" charset="0"/>
+              </a:rPr>
+              <a:t>” ?</a:t>
+            </a:r>
+          </a:p>
+          <a:p>
+            <a:pPr lvl="1">
+              <a:spcAft>
+                <a:spcPts val="1200"/>
+              </a:spcAft>
+            </a:pPr>
+            <a:endParaRPr lang="en-US" sz="1400" dirty="0">
+              <a:latin typeface="Poppins Light" panose="00000400000000000000" pitchFamily="2" charset="0"/>
+              <a:cs typeface="Poppins Light" panose="00000400000000000000" pitchFamily="2" charset="0"/>
+            </a:endParaRPr>
+          </a:p>
+          <a:p>
+            <a:pPr>
+              <a:spcAft>
+                <a:spcPts val="1200"/>
+              </a:spcAft>
+            </a:pPr>
+            <a:endParaRPr lang="en-US" sz="1400" dirty="0">
+              <a:latin typeface="Poppins Light" panose="00000400000000000000" pitchFamily="2" charset="0"/>
+              <a:cs typeface="Poppins Light" panose="00000400000000000000" pitchFamily="2" charset="0"/>
+            </a:endParaRPr>
+          </a:p>
+          <a:p>
+            <a:pPr marL="285750" indent="-285750">
+              <a:spcAft>
+                <a:spcPts val="1200"/>
+              </a:spcAft>
+              <a:buFont typeface="Wingdings" panose="05000000000000000000" pitchFamily="2" charset="2"/>
+              <a:buChar char="q"/>
+            </a:pPr>
+            <a:r>
+              <a:rPr lang="en-US" sz="1400" dirty="0" err="1">
+                <a:latin typeface="Poppins Light" panose="00000400000000000000" pitchFamily="2" charset="0"/>
+                <a:cs typeface="Poppins Light" panose="00000400000000000000" pitchFamily="2" charset="0"/>
+              </a:rPr>
+              <a:t>Quali</a:t>
+            </a:r>
+            <a:r>
+              <a:rPr lang="en-US" sz="1400" dirty="0">
+                <a:latin typeface="Poppins Light" panose="00000400000000000000" pitchFamily="2" charset="0"/>
+                <a:cs typeface="Poppins Light" panose="00000400000000000000" pitchFamily="2" charset="0"/>
+              </a:rPr>
+              <a:t> </a:t>
+            </a:r>
+            <a:r>
+              <a:rPr lang="en-US" sz="1400" dirty="0" err="1">
+                <a:latin typeface="Poppins Light" panose="00000400000000000000" pitchFamily="2" charset="0"/>
+                <a:cs typeface="Poppins Light" panose="00000400000000000000" pitchFamily="2" charset="0"/>
+              </a:rPr>
+              <a:t>sono</a:t>
+            </a:r>
+            <a:r>
+              <a:rPr lang="en-US" sz="1400" dirty="0">
+                <a:latin typeface="Poppins Light" panose="00000400000000000000" pitchFamily="2" charset="0"/>
+                <a:cs typeface="Poppins Light" panose="00000400000000000000" pitchFamily="2" charset="0"/>
+              </a:rPr>
+              <a:t> le skills </a:t>
+            </a:r>
+            <a:r>
+              <a:rPr lang="en-US" sz="1400" dirty="0" err="1">
+                <a:latin typeface="Poppins Light" panose="00000400000000000000" pitchFamily="2" charset="0"/>
+                <a:cs typeface="Poppins Light" panose="00000400000000000000" pitchFamily="2" charset="0"/>
+              </a:rPr>
+              <a:t>necessarie</a:t>
+            </a:r>
+            <a:r>
+              <a:rPr lang="en-US" sz="1400" dirty="0">
+                <a:latin typeface="Poppins Light" panose="00000400000000000000" pitchFamily="2" charset="0"/>
+                <a:cs typeface="Poppins Light" panose="00000400000000000000" pitchFamily="2" charset="0"/>
+              </a:rPr>
+              <a:t> in un mondo </a:t>
+            </a:r>
+            <a:r>
+              <a:rPr lang="en-US" sz="1400" dirty="0" err="1">
+                <a:latin typeface="Poppins Light" panose="00000400000000000000" pitchFamily="2" charset="0"/>
+                <a:cs typeface="Poppins Light" panose="00000400000000000000" pitchFamily="2" charset="0"/>
+              </a:rPr>
+              <a:t>digitale</a:t>
+            </a:r>
+            <a:r>
+              <a:rPr lang="en-US" sz="1400" dirty="0">
+                <a:latin typeface="Poppins Light" panose="00000400000000000000" pitchFamily="2" charset="0"/>
+                <a:cs typeface="Poppins Light" panose="00000400000000000000" pitchFamily="2" charset="0"/>
+              </a:rPr>
+              <a:t> ?</a:t>
+            </a:r>
+          </a:p>
+          <a:p>
+            <a:pPr>
+              <a:spcAft>
+                <a:spcPts val="1200"/>
+              </a:spcAft>
+            </a:pPr>
+            <a:endParaRPr lang="en-US" sz="1400" dirty="0">
+              <a:latin typeface="Poppins Light" panose="00000400000000000000" pitchFamily="2" charset="0"/>
+              <a:cs typeface="Poppins Light" panose="00000400000000000000" pitchFamily="2" charset="0"/>
+            </a:endParaRPr>
+          </a:p>
+          <a:p>
+            <a:pPr marL="285750" indent="-285750">
+              <a:spcAft>
+                <a:spcPts val="1200"/>
+              </a:spcAft>
+              <a:buFont typeface="Wingdings" panose="05000000000000000000" pitchFamily="2" charset="2"/>
+              <a:buChar char="q"/>
+            </a:pPr>
+            <a:endParaRPr lang="it-IT" sz="1400" dirty="0">
+              <a:latin typeface="Poppins Light" panose="00000400000000000000" pitchFamily="2" charset="0"/>
+              <a:cs typeface="Poppins Light" panose="00000400000000000000" pitchFamily="2" charset="0"/>
+            </a:endParaRPr>
+          </a:p>
+        </p:txBody>
+      </p:sp>
+      <p:cxnSp>
+        <p:nvCxnSpPr>
+          <p:cNvPr id="4" name="Connettore diritto 3">
+            <a:extLst>
+              <a:ext uri="{FF2B5EF4-FFF2-40B4-BE49-F238E27FC236}">
+                <a16:creationId xmlns:a16="http://schemas.microsoft.com/office/drawing/2014/main" id="{51FD34F7-E331-45F9-984B-6D3860116CA5}"/>
+              </a:ext>
+            </a:extLst>
+          </p:cNvPr>
+          <p:cNvCxnSpPr>
+            <a:cxnSpLocks/>
+          </p:cNvCxnSpPr>
+          <p:nvPr/>
+        </p:nvCxnSpPr>
+        <p:spPr>
+          <a:xfrm>
+            <a:off x="772998" y="1134050"/>
+            <a:ext cx="1775649" cy="0"/>
+          </a:xfrm>
+          <a:prstGeom prst="line">
+            <a:avLst/>
+          </a:prstGeom>
+          <a:ln w="38100">
+            <a:solidFill>
+              <a:schemeClr val="accent2"/>
+            </a:solidFill>
+          </a:ln>
+        </p:spPr>
+        <p:style>
+          <a:lnRef idx="3">
+            <a:schemeClr val="accent2"/>
+          </a:lnRef>
+          <a:fillRef idx="0">
+            <a:schemeClr val="accent2"/>
+          </a:fillRef>
+          <a:effectRef idx="2">
+            <a:schemeClr val="accent2"/>
+          </a:effectRef>
+          <a:fontRef idx="minor">
+            <a:schemeClr val="tx1"/>
+          </a:fontRef>
+        </p:style>
+      </p:cxnSp>
+      <p:pic>
+        <p:nvPicPr>
+          <p:cNvPr id="15" name="Immagine 14" descr="Immagine che contiene interni, tavolo, tavolo da pranzo&#10;&#10;Descrizione generata automaticamente">
+            <a:extLst>
+              <a:ext uri="{FF2B5EF4-FFF2-40B4-BE49-F238E27FC236}">
+                <a16:creationId xmlns:a16="http://schemas.microsoft.com/office/drawing/2014/main" id="{0FA78F81-25EE-4C6B-BB5F-8F4184FAD4AA}"/>
+              </a:ext>
+            </a:extLst>
+          </p:cNvPr>
+          <p:cNvPicPr>
+            <a:picLocks noChangeAspect="1"/>
+          </p:cNvPicPr>
+          <p:nvPr/>
+        </p:nvPicPr>
+        <p:blipFill rotWithShape="1">
+          <a:blip r:embed="rId2">
+            <a:extLst>
+              <a:ext uri="{28A0092B-C50C-407E-A947-70E740481C1C}">
+                <a14:useLocalDpi xmlns:a14="http://schemas.microsoft.com/office/drawing/2010/main" val="0"/>
+              </a:ext>
+            </a:extLst>
+          </a:blip>
+          <a:srcRect l="14715" t="844" r="18280" b="3188"/>
+          <a:stretch/>
+        </p:blipFill>
+        <p:spPr>
+          <a:xfrm>
+            <a:off x="6240463" y="2060576"/>
+            <a:ext cx="5951537" cy="4151382"/>
+          </a:xfrm>
+          <a:prstGeom prst="rect">
+            <a:avLst/>
+          </a:prstGeom>
+        </p:spPr>
+      </p:pic>
+    </p:spTree>
+    <p:extLst>
+      <p:ext uri="{BB962C8B-B14F-4D97-AF65-F5344CB8AC3E}">
+        <p14:creationId xmlns:p14="http://schemas.microsoft.com/office/powerpoint/2010/main" val="341538158"/>
+      </p:ext>
+    </p:extLst>
+  </p:cSld>
+  <p:clrMapOvr>
+    <a:masterClrMapping/>
+  </p:clrMapOvr>
+</p:sld>
+</file>
+
+<file path=ppt/slides/slide4.xml><?xml version="1.0" encoding="utf-8"?>
+<p:sld xmlns:a="http://schemas.openxmlformats.org/drawingml/2006/main" xmlns:r="http://schemas.openxmlformats.org/officeDocument/2006/relationships" xmlns:p="http://schemas.openxmlformats.org/presentationml/2006/main">
+  <p:cSld>
+    <p:spTree>
+      <p:nvGrpSpPr>
+        <p:cNvPr id="1" name=""/>
+        <p:cNvGrpSpPr/>
+        <p:nvPr/>
+      </p:nvGrpSpPr>
+      <p:grpSpPr>
+        <a:xfrm>
+          <a:off x="0" y="0"/>
+          <a:ext cx="0" cy="0"/>
+          <a:chOff x="0" y="0"/>
+          <a:chExt cx="0" cy="0"/>
+        </a:xfrm>
+      </p:grpSpPr>
+      <p:sp>
+        <p:nvSpPr>
+          <p:cNvPr id="5" name="CasellaDiTesto 4">
+            <a:extLst>
+              <a:ext uri="{FF2B5EF4-FFF2-40B4-BE49-F238E27FC236}">
+                <a16:creationId xmlns:a16="http://schemas.microsoft.com/office/drawing/2014/main" id="{89B91983-B758-4281-AC68-D9F7AB480AD9}"/>
+              </a:ext>
+            </a:extLst>
+          </p:cNvPr>
+          <p:cNvSpPr txBox="1"/>
+          <p:nvPr/>
+        </p:nvSpPr>
+        <p:spPr>
+          <a:xfrm>
+            <a:off x="704849" y="549275"/>
+            <a:ext cx="8020051" cy="584775"/>
+          </a:xfrm>
+          <a:prstGeom prst="rect">
+            <a:avLst/>
+          </a:prstGeom>
+          <a:noFill/>
+        </p:spPr>
+        <p:txBody>
+          <a:bodyPr wrap="square" rtlCol="0">
+            <a:spAutoFit/>
+          </a:bodyPr>
+          <a:lstStyle/>
+          <a:p>
+            <a:r>
               <a:rPr lang="it-IT" sz="2800" dirty="0">
                 <a:latin typeface="Lato Black" panose="020F0502020204030203" pitchFamily="34" charset="0"/>
                 <a:ea typeface="Lato Black" panose="020F0502020204030203" pitchFamily="34" charset="0"/>
@@ -5314,21 +5965,8 @@
                 <a:ea typeface="Lato Black" panose="020F0502020204030203" pitchFamily="34" charset="0"/>
                 <a:cs typeface="Lato Black" panose="020F0502020204030203" pitchFamily="34" charset="0"/>
               </a:rPr>
-              <a:t>Non </a:t>
-            </a:r>
-            <a:r>
-              <a:rPr lang="it-IT" sz="3200" dirty="0" err="1">
-                <a:latin typeface="Lato Black" panose="020F0502020204030203" pitchFamily="34" charset="0"/>
-                <a:ea typeface="Lato Black" panose="020F0502020204030203" pitchFamily="34" charset="0"/>
-                <a:cs typeface="Lato Black" panose="020F0502020204030203" pitchFamily="34" charset="0"/>
-              </a:rPr>
-              <a:t>Users</a:t>
-            </a:r>
-            <a:endParaRPr lang="it-IT" sz="3200" dirty="0">
-              <a:latin typeface="Lato Black" panose="020F0502020204030203" pitchFamily="34" charset="0"/>
-              <a:ea typeface="Lato Black" panose="020F0502020204030203" pitchFamily="34" charset="0"/>
-              <a:cs typeface="Lato Black" panose="020F0502020204030203" pitchFamily="34" charset="0"/>
-            </a:endParaRPr>
+              <a:t>Non Users</a:t>
+            </a:r>
           </a:p>
         </p:txBody>
       </p:sp>
@@ -5607,7 +6245,7 @@
         </p:blipFill>
         <p:spPr>
           <a:xfrm>
-            <a:off x="6240463" y="175410"/>
+            <a:off x="6240463" y="117044"/>
             <a:ext cx="3052253" cy="1878310"/>
           </a:xfrm>
           <a:prstGeom prst="rect">
@@ -5776,7 +6414,7 @@
 </p:sld>
 </file>
 
-<file path=ppt/slides/slide4.xml><?xml version="1.0" encoding="utf-8"?>
+<file path=ppt/slides/slide5.xml><?xml version="1.0" encoding="utf-8"?>
 <p:sld xmlns:a="http://schemas.openxmlformats.org/drawingml/2006/main" xmlns:r="http://schemas.openxmlformats.org/officeDocument/2006/relationships" xmlns:p="http://schemas.openxmlformats.org/presentationml/2006/main">
   <p:cSld>
     <p:spTree>
@@ -6448,7 +7086,7 @@
 </p:sld>
 </file>
 
-<file path=ppt/slides/slide5.xml><?xml version="1.0" encoding="utf-8"?>
+<file path=ppt/slides/slide6.xml><?xml version="1.0" encoding="utf-8"?>
 <p:sld xmlns:a="http://schemas.openxmlformats.org/drawingml/2006/main" xmlns:r="http://schemas.openxmlformats.org/officeDocument/2006/relationships" xmlns:p="http://schemas.openxmlformats.org/presentationml/2006/main">
   <p:cSld>
     <p:spTree>
@@ -6894,7 +7532,7 @@
 </p:sld>
 </file>
 
-<file path=ppt/slides/slide6.xml><?xml version="1.0" encoding="utf-8"?>
+<file path=ppt/slides/slide7.xml><?xml version="1.0" encoding="utf-8"?>
 <p:sld xmlns:a="http://schemas.openxmlformats.org/drawingml/2006/main" xmlns:r="http://schemas.openxmlformats.org/officeDocument/2006/relationships" xmlns:p="http://schemas.openxmlformats.org/presentationml/2006/main">
   <p:cSld>
     <p:spTree>
@@ -7221,7 +7859,7 @@
 </p:sld>
 </file>
 
-<file path=ppt/slides/slide7.xml><?xml version="1.0" encoding="utf-8"?>
+<file path=ppt/slides/slide8.xml><?xml version="1.0" encoding="utf-8"?>
 <p:sld xmlns:a="http://schemas.openxmlformats.org/drawingml/2006/main" xmlns:r="http://schemas.openxmlformats.org/officeDocument/2006/relationships" xmlns:p="http://schemas.openxmlformats.org/presentationml/2006/main">
   <p:cSld>
     <p:spTree>
@@ -7661,7 +8299,7 @@
 </p:sld>
 </file>
 
-<file path=ppt/slides/slide8.xml><?xml version="1.0" encoding="utf-8"?>
+<file path=ppt/slides/slide9.xml><?xml version="1.0" encoding="utf-8"?>
 <p:sld xmlns:a="http://schemas.openxmlformats.org/drawingml/2006/main" xmlns:r="http://schemas.openxmlformats.org/officeDocument/2006/relationships" xmlns:p="http://schemas.openxmlformats.org/presentationml/2006/main">
   <p:cSld>
     <p:spTree>

</xml_diff>

<commit_message>
Update Presentazione_completa - Copy.pptx
</commit_message>
<xml_diff>
--- a/Presentazione/Presentazione_completa - Copy.pptx
+++ b/Presentazione/Presentazione_completa - Copy.pptx
@@ -195,7 +195,7 @@
 <file path=ppt/revisionInfo.xml><?xml version="1.0" encoding="utf-8"?>
 <p1510:revInfo xmlns:a="http://schemas.openxmlformats.org/drawingml/2006/main" xmlns:r="http://schemas.openxmlformats.org/officeDocument/2006/relationships" xmlns:p1510="http://schemas.microsoft.com/office/powerpoint/2015/10/main">
   <p1510:revLst>
-    <p1510:client id="{663EDA11-63A3-4725-9154-08D0D2B3E39E}" v="302" dt="2021-12-28T14:38:24.446"/>
+    <p1510:client id="{663EDA11-63A3-4725-9154-08D0D2B3E39E}" v="353" dt="2021-12-28T17:01:02.485"/>
   </p1510:revLst>
 </p1510:revInfo>
 </file>
@@ -205,7 +205,7 @@
   <pc:docChgLst>
     <pc:chgData name="Silvia Grosso" userId="ae07bb24dcdc86e9" providerId="LiveId" clId="{663EDA11-63A3-4725-9154-08D0D2B3E39E}"/>
     <pc:docChg chg="undo custSel addSld delSld modSld">
-      <pc:chgData name="Silvia Grosso" userId="ae07bb24dcdc86e9" providerId="LiveId" clId="{663EDA11-63A3-4725-9154-08D0D2B3E39E}" dt="2021-12-28T14:53:21.740" v="2589" actId="5793"/>
+      <pc:chgData name="Silvia Grosso" userId="ae07bb24dcdc86e9" providerId="LiveId" clId="{663EDA11-63A3-4725-9154-08D0D2B3E39E}" dt="2021-12-28T17:01:02.485" v="2640" actId="1076"/>
       <pc:docMkLst>
         <pc:docMk/>
       </pc:docMkLst>
@@ -652,6 +652,69 @@
           <pc:sldMk cId="2479181778" sldId="300"/>
         </pc:sldMkLst>
       </pc:sldChg>
+      <pc:sldChg chg="addSp delSp modSp">
+        <pc:chgData name="Silvia Grosso" userId="ae07bb24dcdc86e9" providerId="LiveId" clId="{663EDA11-63A3-4725-9154-08D0D2B3E39E}" dt="2021-12-28T17:01:02.485" v="2640" actId="1076"/>
+        <pc:sldMkLst>
+          <pc:docMk/>
+          <pc:sldMk cId="3124619789" sldId="301"/>
+        </pc:sldMkLst>
+        <pc:picChg chg="add mod">
+          <ac:chgData name="Silvia Grosso" userId="ae07bb24dcdc86e9" providerId="LiveId" clId="{663EDA11-63A3-4725-9154-08D0D2B3E39E}" dt="2021-12-28T17:01:02.485" v="2640" actId="1076"/>
+          <ac:picMkLst>
+            <pc:docMk/>
+            <pc:sldMk cId="3124619789" sldId="301"/>
+            <ac:picMk id="10" creationId="{BCB1C76D-3166-4F5E-8309-6DAD42B7FD20}"/>
+          </ac:picMkLst>
+        </pc:picChg>
+        <pc:picChg chg="add del mod">
+          <ac:chgData name="Silvia Grosso" userId="ae07bb24dcdc86e9" providerId="LiveId" clId="{663EDA11-63A3-4725-9154-08D0D2B3E39E}" dt="2021-12-28T16:59:34.047" v="2628" actId="21"/>
+          <ac:picMkLst>
+            <pc:docMk/>
+            <pc:sldMk cId="3124619789" sldId="301"/>
+            <ac:picMk id="14" creationId="{02CCE27C-18BE-444A-8405-7760621926CC}"/>
+          </ac:picMkLst>
+        </pc:picChg>
+        <pc:picChg chg="add mod">
+          <ac:chgData name="Silvia Grosso" userId="ae07bb24dcdc86e9" providerId="LiveId" clId="{663EDA11-63A3-4725-9154-08D0D2B3E39E}" dt="2021-12-28T17:01:00.280" v="2639" actId="1076"/>
+          <ac:picMkLst>
+            <pc:docMk/>
+            <pc:sldMk cId="3124619789" sldId="301"/>
+            <ac:picMk id="15" creationId="{5412465D-BC73-4ED7-8B9E-EEAC1248CE3F}"/>
+          </ac:picMkLst>
+        </pc:picChg>
+        <pc:picChg chg="add mod">
+          <ac:chgData name="Silvia Grosso" userId="ae07bb24dcdc86e9" providerId="LiveId" clId="{663EDA11-63A3-4725-9154-08D0D2B3E39E}" dt="2021-12-28T17:00:28.499" v="2635" actId="1076"/>
+          <ac:picMkLst>
+            <pc:docMk/>
+            <pc:sldMk cId="3124619789" sldId="301"/>
+            <ac:picMk id="1026" creationId="{B36C37CE-5867-47A3-9682-E70C82ACC938}"/>
+          </ac:picMkLst>
+        </pc:picChg>
+        <pc:picChg chg="add del mod">
+          <ac:chgData name="Silvia Grosso" userId="ae07bb24dcdc86e9" providerId="LiveId" clId="{663EDA11-63A3-4725-9154-08D0D2B3E39E}" dt="2021-12-28T16:58:22.556" v="2610" actId="478"/>
+          <ac:picMkLst>
+            <pc:docMk/>
+            <pc:sldMk cId="3124619789" sldId="301"/>
+            <ac:picMk id="1028" creationId="{263136C8-ADDE-42CE-939E-E20EECB2EB3A}"/>
+          </ac:picMkLst>
+        </pc:picChg>
+        <pc:picChg chg="add del mod">
+          <ac:chgData name="Silvia Grosso" userId="ae07bb24dcdc86e9" providerId="LiveId" clId="{663EDA11-63A3-4725-9154-08D0D2B3E39E}" dt="2021-12-28T16:58:22.556" v="2610" actId="478"/>
+          <ac:picMkLst>
+            <pc:docMk/>
+            <pc:sldMk cId="3124619789" sldId="301"/>
+            <ac:picMk id="1030" creationId="{75746072-367E-4797-A7D6-716FB74095E0}"/>
+          </ac:picMkLst>
+        </pc:picChg>
+        <pc:picChg chg="add mod">
+          <ac:chgData name="Silvia Grosso" userId="ae07bb24dcdc86e9" providerId="LiveId" clId="{663EDA11-63A3-4725-9154-08D0D2B3E39E}" dt="2021-12-28T17:00:51.069" v="2638" actId="1076"/>
+          <ac:picMkLst>
+            <pc:docMk/>
+            <pc:sldMk cId="3124619789" sldId="301"/>
+            <ac:picMk id="1032" creationId="{CDC95665-EA5A-4412-B73A-DD17F4D69364}"/>
+          </ac:picMkLst>
+        </pc:picChg>
+      </pc:sldChg>
     </pc:docChg>
   </pc:docChgLst>
 </pc:chgInfo>
@@ -739,7 +802,7 @@
           <a:p>
             <a:fld id="{445FCF14-918E-4047-8BBB-15CFF9EA5E07}" type="datetimeFigureOut">
               <a:rPr lang="it-IT" smtClean="0"/>
-              <a:t>28/12/21</a:t>
+              <a:t>28/12/2021</a:t>
             </a:fld>
             <a:endParaRPr lang="it-IT"/>
           </a:p>
@@ -1153,7 +1216,7 @@
           <a:p>
             <a:fld id="{AA3A6BE5-8C39-481F-A270-BEF917F1E5E1}" type="datetimeFigureOut">
               <a:rPr lang="it-IT" smtClean="0"/>
-              <a:t>28/12/21</a:t>
+              <a:t>28/12/2021</a:t>
             </a:fld>
             <a:endParaRPr lang="it-IT"/>
           </a:p>
@@ -1351,7 +1414,7 @@
           <a:p>
             <a:fld id="{AA3A6BE5-8C39-481F-A270-BEF917F1E5E1}" type="datetimeFigureOut">
               <a:rPr lang="it-IT" smtClean="0"/>
-              <a:t>28/12/21</a:t>
+              <a:t>28/12/2021</a:t>
             </a:fld>
             <a:endParaRPr lang="it-IT"/>
           </a:p>
@@ -1559,7 +1622,7 @@
           <a:p>
             <a:fld id="{AA3A6BE5-8C39-481F-A270-BEF917F1E5E1}" type="datetimeFigureOut">
               <a:rPr lang="it-IT" smtClean="0"/>
-              <a:t>28/12/21</a:t>
+              <a:t>28/12/2021</a:t>
             </a:fld>
             <a:endParaRPr lang="it-IT"/>
           </a:p>
@@ -1757,7 +1820,7 @@
           <a:p>
             <a:fld id="{AA3A6BE5-8C39-481F-A270-BEF917F1E5E1}" type="datetimeFigureOut">
               <a:rPr lang="it-IT" smtClean="0"/>
-              <a:t>28/12/21</a:t>
+              <a:t>28/12/2021</a:t>
             </a:fld>
             <a:endParaRPr lang="it-IT"/>
           </a:p>
@@ -2032,7 +2095,7 @@
           <a:p>
             <a:fld id="{AA3A6BE5-8C39-481F-A270-BEF917F1E5E1}" type="datetimeFigureOut">
               <a:rPr lang="it-IT" smtClean="0"/>
-              <a:t>28/12/21</a:t>
+              <a:t>28/12/2021</a:t>
             </a:fld>
             <a:endParaRPr lang="it-IT"/>
           </a:p>
@@ -2297,7 +2360,7 @@
           <a:p>
             <a:fld id="{AA3A6BE5-8C39-481F-A270-BEF917F1E5E1}" type="datetimeFigureOut">
               <a:rPr lang="it-IT" smtClean="0"/>
-              <a:t>28/12/21</a:t>
+              <a:t>28/12/2021</a:t>
             </a:fld>
             <a:endParaRPr lang="it-IT"/>
           </a:p>
@@ -2709,7 +2772,7 @@
           <a:p>
             <a:fld id="{AA3A6BE5-8C39-481F-A270-BEF917F1E5E1}" type="datetimeFigureOut">
               <a:rPr lang="it-IT" smtClean="0"/>
-              <a:t>28/12/21</a:t>
+              <a:t>28/12/2021</a:t>
             </a:fld>
             <a:endParaRPr lang="it-IT"/>
           </a:p>
@@ -2850,7 +2913,7 @@
           <a:p>
             <a:fld id="{AA3A6BE5-8C39-481F-A270-BEF917F1E5E1}" type="datetimeFigureOut">
               <a:rPr lang="it-IT" smtClean="0"/>
-              <a:t>28/12/21</a:t>
+              <a:t>28/12/2021</a:t>
             </a:fld>
             <a:endParaRPr lang="it-IT"/>
           </a:p>
@@ -2963,7 +3026,7 @@
           <a:p>
             <a:fld id="{AA3A6BE5-8C39-481F-A270-BEF917F1E5E1}" type="datetimeFigureOut">
               <a:rPr lang="it-IT" smtClean="0"/>
-              <a:t>28/12/21</a:t>
+              <a:t>28/12/2021</a:t>
             </a:fld>
             <a:endParaRPr lang="it-IT"/>
           </a:p>
@@ -3274,7 +3337,7 @@
           <a:p>
             <a:fld id="{AA3A6BE5-8C39-481F-A270-BEF917F1E5E1}" type="datetimeFigureOut">
               <a:rPr lang="it-IT" smtClean="0"/>
-              <a:t>28/12/21</a:t>
+              <a:t>28/12/2021</a:t>
             </a:fld>
             <a:endParaRPr lang="it-IT"/>
           </a:p>
@@ -3562,7 +3625,7 @@
           <a:p>
             <a:fld id="{AA3A6BE5-8C39-481F-A270-BEF917F1E5E1}" type="datetimeFigureOut">
               <a:rPr lang="it-IT" smtClean="0"/>
-              <a:t>28/12/21</a:t>
+              <a:t>28/12/2021</a:t>
             </a:fld>
             <a:endParaRPr lang="it-IT"/>
           </a:p>
@@ -3803,7 +3866,7 @@
           <a:p>
             <a:fld id="{AA3A6BE5-8C39-481F-A270-BEF917F1E5E1}" type="datetimeFigureOut">
               <a:rPr lang="it-IT" smtClean="0"/>
-              <a:t>28/12/21</a:t>
+              <a:t>28/12/2021</a:t>
             </a:fld>
             <a:endParaRPr lang="it-IT"/>
           </a:p>
@@ -6218,6 +6281,186 @@
           </a:fontRef>
         </p:style>
       </p:cxnSp>
+      <p:pic>
+        <p:nvPicPr>
+          <p:cNvPr id="1026" name="Picture 2" descr="Grafico delle risposte di Moduli. Titolo della domanda: Quante ore al giorno mediamente utilizzi lo smartphone?. Numero di risposte: 143 risposte.">
+            <a:extLst>
+              <a:ext uri="{FF2B5EF4-FFF2-40B4-BE49-F238E27FC236}">
+                <a16:creationId xmlns:a16="http://schemas.microsoft.com/office/drawing/2014/main" id="{B36C37CE-5867-47A3-9682-E70C82ACC938}"/>
+              </a:ext>
+            </a:extLst>
+          </p:cNvPr>
+          <p:cNvPicPr>
+            <a:picLocks noChangeAspect="1" noChangeArrowheads="1"/>
+          </p:cNvPicPr>
+          <p:nvPr/>
+        </p:nvPicPr>
+        <p:blipFill rotWithShape="1">
+          <a:blip r:embed="rId4">
+            <a:extLst>
+              <a:ext uri="{28A0092B-C50C-407E-A947-70E740481C1C}">
+                <a14:useLocalDpi xmlns:a14="http://schemas.microsoft.com/office/drawing/2010/main" val="0"/>
+              </a:ext>
+            </a:extLst>
+          </a:blip>
+          <a:srcRect l="19628" t="29248" r="53840" b="9494"/>
+          <a:stretch/>
+        </p:blipFill>
+        <p:spPr bwMode="auto">
+          <a:xfrm>
+            <a:off x="8916433" y="689346"/>
+            <a:ext cx="2388827" cy="2320385"/>
+          </a:xfrm>
+          <a:prstGeom prst="rect">
+            <a:avLst/>
+          </a:prstGeom>
+          <a:noFill/>
+          <a:extLst>
+            <a:ext uri="{909E8E84-426E-40DD-AFC4-6F175D3DCCD1}">
+              <a14:hiddenFill xmlns:a14="http://schemas.microsoft.com/office/drawing/2010/main">
+                <a:solidFill>
+                  <a:srgbClr val="FFFFFF"/>
+                </a:solidFill>
+              </a14:hiddenFill>
+            </a:ext>
+          </a:extLst>
+        </p:spPr>
+      </p:pic>
+      <p:pic>
+        <p:nvPicPr>
+          <p:cNvPr id="10" name="Picture 2" descr="Grafico delle risposte di Moduli. Titolo della domanda: Quante ore al giorno mediamente utilizzi lo smartphone?. Numero di risposte: 143 risposte.">
+            <a:extLst>
+              <a:ext uri="{FF2B5EF4-FFF2-40B4-BE49-F238E27FC236}">
+                <a16:creationId xmlns:a16="http://schemas.microsoft.com/office/drawing/2014/main" id="{BCB1C76D-3166-4F5E-8309-6DAD42B7FD20}"/>
+              </a:ext>
+            </a:extLst>
+          </p:cNvPr>
+          <p:cNvPicPr>
+            <a:picLocks noChangeAspect="1" noChangeArrowheads="1"/>
+          </p:cNvPicPr>
+          <p:nvPr/>
+        </p:nvPicPr>
+        <p:blipFill rotWithShape="1">
+          <a:blip r:embed="rId4">
+            <a:extLst>
+              <a:ext uri="{28A0092B-C50C-407E-A947-70E740481C1C}">
+                <a14:useLocalDpi xmlns:a14="http://schemas.microsoft.com/office/drawing/2010/main" val="0"/>
+              </a:ext>
+            </a:extLst>
+          </a:blip>
+          <a:srcRect l="61982" t="29248" r="24654" b="45820"/>
+          <a:stretch/>
+        </p:blipFill>
+        <p:spPr bwMode="auto">
+          <a:xfrm>
+            <a:off x="7232251" y="549275"/>
+            <a:ext cx="1299765" cy="1020121"/>
+          </a:xfrm>
+          <a:prstGeom prst="rect">
+            <a:avLst/>
+          </a:prstGeom>
+          <a:noFill/>
+          <a:extLst>
+            <a:ext uri="{909E8E84-426E-40DD-AFC4-6F175D3DCCD1}">
+              <a14:hiddenFill xmlns:a14="http://schemas.microsoft.com/office/drawing/2010/main">
+                <a:solidFill>
+                  <a:srgbClr val="FFFFFF"/>
+                </a:solidFill>
+              </a14:hiddenFill>
+            </a:ext>
+          </a:extLst>
+        </p:spPr>
+      </p:pic>
+      <p:pic>
+        <p:nvPicPr>
+          <p:cNvPr id="1032" name="Picture 8" descr="Grafico delle risposte di Moduli. Titolo della domanda: Quante ore al giorno mediamente utilizzi il computer?. Numero di risposte: 141 risposte.">
+            <a:extLst>
+              <a:ext uri="{FF2B5EF4-FFF2-40B4-BE49-F238E27FC236}">
+                <a16:creationId xmlns:a16="http://schemas.microsoft.com/office/drawing/2014/main" id="{CDC95665-EA5A-4412-B73A-DD17F4D69364}"/>
+              </a:ext>
+            </a:extLst>
+          </p:cNvPr>
+          <p:cNvPicPr>
+            <a:picLocks noChangeAspect="1" noChangeArrowheads="1"/>
+          </p:cNvPicPr>
+          <p:nvPr/>
+        </p:nvPicPr>
+        <p:blipFill rotWithShape="1">
+          <a:blip r:embed="rId5">
+            <a:extLst>
+              <a:ext uri="{28A0092B-C50C-407E-A947-70E740481C1C}">
+                <a14:useLocalDpi xmlns:a14="http://schemas.microsoft.com/office/drawing/2010/main" val="0"/>
+              </a:ext>
+            </a:extLst>
+          </a:blip>
+          <a:srcRect l="19149" t="27482" r="53883" b="9175"/>
+          <a:stretch/>
+        </p:blipFill>
+        <p:spPr bwMode="auto">
+          <a:xfrm>
+            <a:off x="8890818" y="3591360"/>
+            <a:ext cx="2440055" cy="2411181"/>
+          </a:xfrm>
+          <a:prstGeom prst="rect">
+            <a:avLst/>
+          </a:prstGeom>
+          <a:noFill/>
+          <a:extLst>
+            <a:ext uri="{909E8E84-426E-40DD-AFC4-6F175D3DCCD1}">
+              <a14:hiddenFill xmlns:a14="http://schemas.microsoft.com/office/drawing/2010/main">
+                <a:solidFill>
+                  <a:srgbClr val="FFFFFF"/>
+                </a:solidFill>
+              </a14:hiddenFill>
+            </a:ext>
+          </a:extLst>
+        </p:spPr>
+      </p:pic>
+      <p:pic>
+        <p:nvPicPr>
+          <p:cNvPr id="15" name="Picture 2" descr="Grafico delle risposte di Moduli. Titolo della domanda: Quante ore al giorno mediamente utilizzi lo smartphone?. Numero di risposte: 143 risposte.">
+            <a:extLst>
+              <a:ext uri="{FF2B5EF4-FFF2-40B4-BE49-F238E27FC236}">
+                <a16:creationId xmlns:a16="http://schemas.microsoft.com/office/drawing/2014/main" id="{5412465D-BC73-4ED7-8B9E-EEAC1248CE3F}"/>
+              </a:ext>
+            </a:extLst>
+          </p:cNvPr>
+          <p:cNvPicPr>
+            <a:picLocks noChangeAspect="1" noChangeArrowheads="1"/>
+          </p:cNvPicPr>
+          <p:nvPr/>
+        </p:nvPicPr>
+        <p:blipFill rotWithShape="1">
+          <a:blip r:embed="rId4">
+            <a:extLst>
+              <a:ext uri="{28A0092B-C50C-407E-A947-70E740481C1C}">
+                <a14:useLocalDpi xmlns:a14="http://schemas.microsoft.com/office/drawing/2010/main" val="0"/>
+              </a:ext>
+            </a:extLst>
+          </a:blip>
+          <a:srcRect l="61982" t="29248" r="24654" b="45820"/>
+          <a:stretch/>
+        </p:blipFill>
+        <p:spPr bwMode="auto">
+          <a:xfrm>
+            <a:off x="7232252" y="3429000"/>
+            <a:ext cx="1299765" cy="1020121"/>
+          </a:xfrm>
+          <a:prstGeom prst="rect">
+            <a:avLst/>
+          </a:prstGeom>
+          <a:noFill/>
+          <a:extLst>
+            <a:ext uri="{909E8E84-426E-40DD-AFC4-6F175D3DCCD1}">
+              <a14:hiddenFill xmlns:a14="http://schemas.microsoft.com/office/drawing/2010/main">
+                <a:solidFill>
+                  <a:srgbClr val="FFFFFF"/>
+                </a:solidFill>
+              </a14:hiddenFill>
+            </a:ext>
+          </a:extLst>
+        </p:spPr>
+      </p:pic>
     </p:spTree>
     <p:extLst>
       <p:ext uri="{BB962C8B-B14F-4D97-AF65-F5344CB8AC3E}">

</xml_diff>

<commit_message>
modfiche definitive report e pres
</commit_message>
<xml_diff>
--- a/Presentazione/Presentazione_completa - Copy.pptx
+++ b/Presentazione/Presentazione_completa - Copy.pptx
@@ -16,7 +16,7 @@
     <p:sldId id="297" r:id="rId7"/>
     <p:sldId id="294" r:id="rId8"/>
     <p:sldId id="296" r:id="rId9"/>
-    <p:sldId id="303" r:id="rId10"/>
+    <p:sldId id="305" r:id="rId10"/>
   </p:sldIdLst>
   <p:sldSz cx="12192000" cy="6858000"/>
   <p:notesSz cx="6858000" cy="9144000"/>
@@ -4831,7 +4831,7 @@
                 <a:latin typeface="Poppins Light" panose="00000400000000000000" pitchFamily="2" charset="0"/>
                 <a:cs typeface="Poppins Light" panose="00000400000000000000" pitchFamily="2" charset="0"/>
               </a:rPr>
-              <a:t>Elisa MERELLI matricola n. 88142	                                 Giorgio CARBONE matricola n. 811974                                                           Silvia GROSSO matricola n. 881993</a:t>
+              <a:t>Elisa MERELLI matricola n. 881427	                                 Giorgio CARBONE matricola n. 811974                                                           Silvia GROSSO matricola n. 881993</a:t>
             </a:r>
           </a:p>
         </p:txBody>
@@ -5294,7 +5294,7 @@
         <p:spPr>
           <a:xfrm>
             <a:off x="772998" y="1134050"/>
-            <a:ext cx="1750746" cy="0"/>
+            <a:ext cx="1765921" cy="0"/>
           </a:xfrm>
           <a:prstGeom prst="line">
             <a:avLst/>
@@ -8395,7 +8395,7 @@
         <p:spPr>
           <a:xfrm>
             <a:off x="704847" y="2024062"/>
-            <a:ext cx="4845561" cy="3108543"/>
+            <a:ext cx="4845561" cy="3323987"/>
           </a:xfrm>
           <a:prstGeom prst="rect">
             <a:avLst/>
@@ -8514,17 +8514,10 @@
             </a:pPr>
             <a:r>
               <a:rPr lang="it-IT" sz="1400" dirty="0">
-                <a:latin typeface="Poppins Medium" panose="00000600000000000000" pitchFamily="2" charset="0"/>
-                <a:cs typeface="Poppins Medium" panose="00000600000000000000" pitchFamily="2" charset="0"/>
-              </a:rPr>
-              <a:t>Utente medio poco stimolato </a:t>
-            </a:r>
-            <a:r>
-              <a:rPr lang="it-IT" sz="1400" dirty="0">
                 <a:latin typeface="Poppins Light" panose="00000400000000000000" pitchFamily="50" charset="0"/>
                 <a:cs typeface="Poppins Light" panose="00000400000000000000" pitchFamily="50" charset="0"/>
               </a:rPr>
-              <a:t>ad imparare </a:t>
+              <a:t>L’approccio è diretto e intuitivo</a:t>
             </a:r>
           </a:p>
           <a:p>
@@ -8537,10 +8530,38 @@
             </a:pPr>
             <a:r>
               <a:rPr lang="it-IT" sz="1400" dirty="0">
+                <a:latin typeface="Poppins Light" panose="00000400000000000000" pitchFamily="2" charset="0"/>
+                <a:cs typeface="Poppins Light" panose="00000400000000000000" pitchFamily="2" charset="0"/>
+              </a:rPr>
+              <a:t>L’</a:t>
+            </a:r>
+            <a:r>
+              <a:rPr lang="it-IT" sz="1400" dirty="0">
+                <a:latin typeface="Poppins Medium" panose="00000600000000000000" pitchFamily="2" charset="0"/>
+                <a:cs typeface="Poppins Medium" panose="00000600000000000000" pitchFamily="2" charset="0"/>
+              </a:rPr>
+              <a:t>utente medio </a:t>
+            </a:r>
+            <a:r>
+              <a:rPr lang="it-IT" sz="1400" dirty="0">
+                <a:latin typeface="Poppins Light" panose="00000400000000000000" pitchFamily="2" charset="0"/>
+                <a:cs typeface="Poppins Light" panose="00000400000000000000" pitchFamily="2" charset="0"/>
+              </a:rPr>
+              <a:t>è</a:t>
+            </a:r>
+            <a:r>
+              <a:rPr lang="it-IT" sz="1400" dirty="0">
+                <a:latin typeface="Poppins Medium" panose="00000600000000000000" pitchFamily="2" charset="0"/>
+                <a:cs typeface="Poppins Medium" panose="00000600000000000000" pitchFamily="2" charset="0"/>
+              </a:rPr>
+              <a:t> poco stimolato </a:t>
+            </a:r>
+            <a:r>
+              <a:rPr lang="it-IT" sz="1400" dirty="0">
                 <a:latin typeface="Poppins Light" panose="00000400000000000000" pitchFamily="50" charset="0"/>
                 <a:cs typeface="Poppins Light" panose="00000400000000000000" pitchFamily="50" charset="0"/>
               </a:rPr>
-              <a:t>Si approccia in modo diretto ed intuitivo </a:t>
+              <a:t>ad imparare </a:t>
             </a:r>
           </a:p>
           <a:p>
@@ -8688,7 +8709,7 @@
     </p:spTree>
     <p:extLst>
       <p:ext uri="{BB962C8B-B14F-4D97-AF65-F5344CB8AC3E}">
-        <p14:creationId xmlns:p14="http://schemas.microsoft.com/office/powerpoint/2010/main" val="1133630273"/>
+        <p14:creationId xmlns:p14="http://schemas.microsoft.com/office/powerpoint/2010/main" val="139565122"/>
       </p:ext>
     </p:extLst>
   </p:cSld>

</xml_diff>